<commit_message>
add model deploy image
</commit_message>
<xml_diff>
--- a/documents/Medical Insurance Cost.pptx
+++ b/documents/Medical Insurance Cost.pptx
@@ -143,7 +143,7 @@
   <pc:docChgLst>
     <pc:chgData name="Hutula, Karina" userId="76360105-4658-44a5-a2e4-d25da711b3ec" providerId="ADAL" clId="{204D18CB-9BF0-4338-8D3A-C3F8565B3CF2}"/>
     <pc:docChg chg="undo custSel modSld">
-      <pc:chgData name="Hutula, Karina" userId="76360105-4658-44a5-a2e4-d25da711b3ec" providerId="ADAL" clId="{204D18CB-9BF0-4338-8D3A-C3F8565B3CF2}" dt="2021-11-22T03:53:11.467" v="459" actId="2085"/>
+      <pc:chgData name="Hutula, Karina" userId="76360105-4658-44a5-a2e4-d25da711b3ec" providerId="ADAL" clId="{204D18CB-9BF0-4338-8D3A-C3F8565B3CF2}" dt="2021-11-22T21:28:40.078" v="469" actId="1076"/>
       <pc:docMkLst>
         <pc:docMk/>
       </pc:docMkLst>
@@ -222,6 +222,21 @@
             <pc:docMk/>
             <pc:sldMk cId="3297823726" sldId="265"/>
             <ac:picMk id="16" creationId="{240BF8DE-7CBC-4EE6-A6C4-E07A4BF1CFD5}"/>
+          </ac:picMkLst>
+        </pc:picChg>
+      </pc:sldChg>
+      <pc:sldChg chg="addSp modSp mod">
+        <pc:chgData name="Hutula, Karina" userId="76360105-4658-44a5-a2e4-d25da711b3ec" providerId="ADAL" clId="{204D18CB-9BF0-4338-8D3A-C3F8565B3CF2}" dt="2021-11-22T21:28:40.078" v="469" actId="1076"/>
+        <pc:sldMkLst>
+          <pc:docMk/>
+          <pc:sldMk cId="2903599816" sldId="266"/>
+        </pc:sldMkLst>
+        <pc:picChg chg="add mod modCrop">
+          <ac:chgData name="Hutula, Karina" userId="76360105-4658-44a5-a2e4-d25da711b3ec" providerId="ADAL" clId="{204D18CB-9BF0-4338-8D3A-C3F8565B3CF2}" dt="2021-11-22T21:28:40.078" v="469" actId="1076"/>
+          <ac:picMkLst>
+            <pc:docMk/>
+            <pc:sldMk cId="2903599816" sldId="266"/>
+            <ac:picMk id="6" creationId="{741D8F37-DD8F-4B62-8F78-F9017584D21D}"/>
           </ac:picMkLst>
         </pc:picChg>
       </pc:sldChg>
@@ -788,7 +803,7 @@
           <a:p>
             <a:fld id="{B565716D-39C9-48C4-A3EB-B88E4515427D}" type="datetimeFigureOut">
               <a:rPr lang="en-US" smtClean="0"/>
-              <a:t>11/21/2021</a:t>
+              <a:t>11/22/2021</a:t>
             </a:fld>
             <a:endParaRPr lang="en-US" dirty="0"/>
           </a:p>
@@ -12417,6 +12432,35 @@
           </a:p>
         </p:txBody>
       </p:sp>
+      <p:pic>
+        <p:nvPicPr>
+          <p:cNvPr id="6" name="Picture 5">
+            <a:extLst>
+              <a:ext uri="{FF2B5EF4-FFF2-40B4-BE49-F238E27FC236}">
+                <a16:creationId xmlns:a16="http://schemas.microsoft.com/office/drawing/2014/main" id="{741D8F37-DD8F-4B62-8F78-F9017584D21D}"/>
+              </a:ext>
+            </a:extLst>
+          </p:cNvPr>
+          <p:cNvPicPr>
+            <a:picLocks noChangeAspect="1"/>
+          </p:cNvPicPr>
+          <p:nvPr/>
+        </p:nvPicPr>
+        <p:blipFill rotWithShape="1">
+          <a:blip r:embed="rId2"/>
+          <a:srcRect l="5320" t="1573" r="2880" b="1654"/>
+          <a:stretch/>
+        </p:blipFill>
+        <p:spPr>
+          <a:xfrm>
+            <a:off x="2178759" y="1421503"/>
+            <a:ext cx="7560000" cy="5374037"/>
+          </a:xfrm>
+          <a:prstGeom prst="rect">
+            <a:avLst/>
+          </a:prstGeom>
+        </p:spPr>
+      </p:pic>
     </p:spTree>
     <p:extLst>
       <p:ext uri="{BB962C8B-B14F-4D97-AF65-F5344CB8AC3E}">
@@ -19864,20 +19908,20 @@
 </file>
 
 <file path=customXml/item1.xml><?xml version="1.0" encoding="utf-8"?>
-<p:properties xmlns:p="http://schemas.microsoft.com/office/2006/metadata/properties" xmlns:xsi="http://www.w3.org/2001/XMLSchema-instance" xmlns:pc="http://schemas.microsoft.com/office/infopath/2007/PartnerControls">
-  <documentManagement>
-    <MediaServiceKeyPoints xmlns="71af3243-3dd4-4a8d-8c0d-dd76da1f02a5" xsi:nil="true"/>
-  </documentManagement>
-</p:properties>
-</file>
-
-<file path=customXml/item2.xml><?xml version="1.0" encoding="utf-8"?>
 <?mso-contentType ?>
 <FormTemplates xmlns="http://schemas.microsoft.com/sharepoint/v3/contenttype/forms">
   <Display>DocumentLibraryForm</Display>
   <Edit>DocumentLibraryForm</Edit>
   <New>DocumentLibraryForm</New>
 </FormTemplates>
+</file>
+
+<file path=customXml/item2.xml><?xml version="1.0" encoding="utf-8"?>
+<p:properties xmlns:p="http://schemas.microsoft.com/office/2006/metadata/properties" xmlns:xsi="http://www.w3.org/2001/XMLSchema-instance" xmlns:pc="http://schemas.microsoft.com/office/infopath/2007/PartnerControls">
+  <documentManagement>
+    <MediaServiceKeyPoints xmlns="71af3243-3dd4-4a8d-8c0d-dd76da1f02a5" xsi:nil="true"/>
+  </documentManagement>
+</p:properties>
 </file>
 
 <file path=customXml/item3.xml><?xml version="1.0" encoding="utf-8"?>
@@ -20092,19 +20136,19 @@
 </file>
 
 <file path=customXml/itemProps1.xml><?xml version="1.0" encoding="utf-8"?>
+<ds:datastoreItem xmlns:ds="http://schemas.openxmlformats.org/officeDocument/2006/customXml" ds:itemID="{0C66BDC7-24D2-4343-8D41-18F9C23F860A}">
+  <ds:schemaRefs>
+    <ds:schemaRef ds:uri="http://schemas.microsoft.com/sharepoint/v3/contenttype/forms"/>
+  </ds:schemaRefs>
+</ds:datastoreItem>
+</file>
+
+<file path=customXml/itemProps2.xml><?xml version="1.0" encoding="utf-8"?>
 <ds:datastoreItem xmlns:ds="http://schemas.openxmlformats.org/officeDocument/2006/customXml" ds:itemID="{AF4BDB64-2AF8-42D4-96C8-B6B6F098993C}">
   <ds:schemaRefs>
     <ds:schemaRef ds:uri="http://schemas.microsoft.com/office/2006/metadata/properties"/>
     <ds:schemaRef ds:uri="http://schemas.microsoft.com/office/infopath/2007/PartnerControls"/>
     <ds:schemaRef ds:uri="71af3243-3dd4-4a8d-8c0d-dd76da1f02a5"/>
-  </ds:schemaRefs>
-</ds:datastoreItem>
-</file>
-
-<file path=customXml/itemProps2.xml><?xml version="1.0" encoding="utf-8"?>
-<ds:datastoreItem xmlns:ds="http://schemas.openxmlformats.org/officeDocument/2006/customXml" ds:itemID="{0C66BDC7-24D2-4343-8D41-18F9C23F860A}">
-  <ds:schemaRefs>
-    <ds:schemaRef ds:uri="http://schemas.microsoft.com/sharepoint/v3/contenttype/forms"/>
   </ds:schemaRefs>
 </ds:datastoreItem>
 </file>

</xml_diff>